<commit_message>
presentation and poster DONE!
</commit_message>
<xml_diff>
--- a/present/AISTATS-2022/reject-slides.pptx
+++ b/present/AISTATS-2022/reject-slides.pptx
@@ -5,7 +5,7 @@
     <p:sldMasterId id="2147483648" r:id="rId1"/>
   </p:sldMasterIdLst>
   <p:notesMasterIdLst>
-    <p:notesMasterId r:id="rId19"/>
+    <p:notesMasterId r:id="rId20"/>
   </p:notesMasterIdLst>
   <p:sldIdLst>
     <p:sldId id="256" r:id="rId2"/>
@@ -24,7 +24,8 @@
     <p:sldId id="282" r:id="rId15"/>
     <p:sldId id="266" r:id="rId16"/>
     <p:sldId id="257" r:id="rId17"/>
-    <p:sldId id="265" r:id="rId18"/>
+    <p:sldId id="275" r:id="rId18"/>
+    <p:sldId id="265" r:id="rId19"/>
   </p:sldIdLst>
   <p:sldSz cx="12192000" cy="6858000"/>
   <p:notesSz cx="6858000" cy="9144000"/>
@@ -148,6 +149,7 @@
             <p14:sldId id="282"/>
             <p14:sldId id="266"/>
             <p14:sldId id="257"/>
+            <p14:sldId id="275"/>
             <p14:sldId id="265"/>
           </p14:sldIdLst>
         </p14:section>
@@ -4484,116 +4486,6 @@
       </p:sp>
       <p:pic>
         <p:nvPicPr>
-          <p:cNvPr id="6" name="Content Placeholder 4">
-            <a:extLst>
-              <a:ext uri="{FF2B5EF4-FFF2-40B4-BE49-F238E27FC236}">
-                <a16:creationId xmlns:a16="http://schemas.microsoft.com/office/drawing/2014/main" id="{6B5C51E6-1957-40C7-AF4D-118278977155}"/>
-              </a:ext>
-            </a:extLst>
-          </p:cNvPr>
-          <p:cNvPicPr>
-            <a:picLocks noChangeAspect="1"/>
-          </p:cNvPicPr>
-          <p:nvPr/>
-        </p:nvPicPr>
-        <p:blipFill>
-          <a:blip r:embed="rId3">
-            <a:clrChange>
-              <a:clrFrom>
-                <a:srgbClr val="FFFFFF"/>
-              </a:clrFrom>
-              <a:clrTo>
-                <a:srgbClr val="FFFFFF">
-                  <a:alpha val="0"/>
-                </a:srgbClr>
-              </a:clrTo>
-            </a:clrChange>
-            <a:extLst>
-              <a:ext uri="{BEBA8EAE-BF5A-486C-A8C5-ECC9F3942E4B}">
-                <a14:imgProps xmlns:a14="http://schemas.microsoft.com/office/drawing/2010/main">
-                  <a14:imgLayer r:embed="rId4">
-                    <a14:imgEffect>
-                      <a14:backgroundRemoval t="5160" b="94349" l="2012" r="99882">
-                        <a14:foregroundMark x1="64465" y1="13163" x2="66036" y2="18673"/>
-                        <a14:foregroundMark x1="63444" y1="9582" x2="64421" y2="13010"/>
-                        <a14:foregroundMark x1="62604" y1="6634" x2="63444" y2="9582"/>
-                        <a14:foregroundMark x1="71720" y1="18933" x2="74399" y2="19055"/>
-                        <a14:foregroundMark x1="70764" y1="18889" x2="71256" y2="18911"/>
-                        <a14:foregroundMark x1="67569" y1="18743" x2="69160" y2="18816"/>
-                        <a14:foregroundMark x1="66036" y1="18673" x2="66784" y2="18707"/>
-                        <a14:foregroundMark x1="78728" y1="18677" x2="92308" y2="15233"/>
-                        <a14:foregroundMark x1="92308" y1="15233" x2="98935" y2="63882"/>
-                        <a14:foregroundMark x1="98935" y1="63882" x2="94793" y2="78133"/>
-                        <a14:foregroundMark x1="94793" y1="78133" x2="87929" y2="87715"/>
-                        <a14:foregroundMark x1="73599" y1="88404" x2="11243" y2="91400"/>
-                        <a14:foregroundMark x1="87929" y1="87715" x2="73611" y2="88403"/>
-                        <a14:foregroundMark x1="11243" y1="91400" x2="4379" y2="79607"/>
-                        <a14:foregroundMark x1="4379" y1="79607" x2="1302" y2="38329"/>
-                        <a14:foregroundMark x1="1302" y1="38329" x2="5325" y2="20393"/>
-                        <a14:foregroundMark x1="5325" y1="20393" x2="10059" y2="9091"/>
-                        <a14:foregroundMark x1="10059" y1="9091" x2="48639" y2="15971"/>
-                        <a14:foregroundMark x1="48639" y1="15971" x2="54675" y2="3194"/>
-                        <a14:foregroundMark x1="54675" y1="3194" x2="62722" y2="5651"/>
-                        <a14:foregroundMark x1="62722" y1="5651" x2="63077" y2="6634"/>
-                        <a14:foregroundMark x1="14556" y1="6634" x2="2722" y2="21376"/>
-                        <a14:foregroundMark x1="2722" y1="21376" x2="4497" y2="74447"/>
-                        <a14:foregroundMark x1="4497" y1="74447" x2="16923" y2="90172"/>
-                        <a14:foregroundMark x1="16923" y1="90172" x2="27692" y2="24816"/>
-                        <a14:foregroundMark x1="27692" y1="24816" x2="18107" y2="11302"/>
-                        <a14:foregroundMark x1="18107" y1="11302" x2="15266" y2="11302"/>
-                        <a14:foregroundMark x1="11834" y1="10319" x2="7929" y2="22359"/>
-                        <a14:foregroundMark x1="7929" y1="22359" x2="4024" y2="55528"/>
-                        <a14:foregroundMark x1="8402" y1="20885" x2="2130" y2="70516"/>
-                        <a14:foregroundMark x1="90414" y1="34152" x2="95503" y2="45946"/>
-                        <a14:foregroundMark x1="95503" y1="45946" x2="91716" y2="70762"/>
-                        <a14:foregroundMark x1="54793" y1="84521" x2="56805" y2="94349"/>
-                        <a14:foregroundMark x1="92189" y1="27273" x2="99882" y2="35381"/>
-                        <a14:foregroundMark x1="55030" y1="56757" x2="39053" y2="85749"/>
-                        <a14:foregroundMark x1="30178" y1="42752" x2="11834" y2="77150"/>
-                        <a14:foregroundMark x1="20828" y1="26044" x2="13491" y2="31941"/>
-                        <a14:foregroundMark x1="63905" y1="53317" x2="55976" y2="56511"/>
-                        <a14:foregroundMark x1="55976" y1="56511" x2="45207" y2="48894"/>
-                        <a14:foregroundMark x1="63077" y1="41769" x2="53018" y2="67568"/>
-                        <a14:foregroundMark x1="60710" y1="37592" x2="74320" y2="63636"/>
-                        <a14:backgroundMark x1="65799" y1="6388" x2="71479" y2="17690"/>
-                        <a14:backgroundMark x1="71479" y1="17690" x2="66982" y2="5405"/>
-                        <a14:backgroundMark x1="66982" y1="5405" x2="66627" y2="8600"/>
-                        <a14:backgroundMark x1="65799" y1="6880" x2="68757" y2="17445"/>
-                        <a14:backgroundMark x1="68876" y1="13514" x2="65325" y2="7125"/>
-                        <a14:backgroundMark x1="72308" y1="6143" x2="68994" y2="13022"/>
-                        <a14:backgroundMark x1="70651" y1="5405" x2="76568" y2="17690"/>
-                        <a14:backgroundMark x1="76568" y1="17690" x2="77278" y2="24570"/>
-                        <a14:backgroundMark x1="68284" y1="71744" x2="62959" y2="82801"/>
-                        <a14:backgroundMark x1="62959" y1="82801" x2="73018" y2="85012"/>
-                        <a14:backgroundMark x1="73018" y1="85012" x2="69467" y2="67076"/>
-                        <a14:backgroundMark x1="69467" y1="67076" x2="64615" y2="74447"/>
-                        <a14:backgroundMark x1="64615" y1="74447" x2="64497" y2="76413"/>
-                        <a14:backgroundMark x1="64970" y1="7371" x2="65207" y2="10074"/>
-                        <a14:backgroundMark x1="65325" y1="9582" x2="65325" y2="9582"/>
-                        <a14:backgroundMark x1="64970" y1="10074" x2="65325" y2="6388"/>
-                      </a14:backgroundRemoval>
-                    </a14:imgEffect>
-                  </a14:imgLayer>
-                </a14:imgProps>
-              </a:ext>
-            </a:extLst>
-          </a:blip>
-          <a:stretch>
-            <a:fillRect/>
-          </a:stretch>
-        </p:blipFill>
-        <p:spPr>
-          <a:xfrm>
-            <a:off x="1872568" y="2196282"/>
-            <a:ext cx="4619582" cy="2225053"/>
-          </a:xfrm>
-          <a:prstGeom prst="rect">
-            <a:avLst/>
-          </a:prstGeom>
-        </p:spPr>
-      </p:pic>
-      <p:pic>
-        <p:nvPicPr>
           <p:cNvPr id="8" name="Content Placeholder 4">
             <a:extLst>
               <a:ext uri="{FF2B5EF4-FFF2-40B4-BE49-F238E27FC236}">
@@ -4607,7 +4499,7 @@
           <p:nvPr/>
         </p:nvPicPr>
         <p:blipFill rotWithShape="1">
-          <a:blip r:embed="rId5">
+          <a:blip r:embed="rId3">
             <a:clrChange>
               <a:clrFrom>
                 <a:srgbClr val="FFFFFF"/>
@@ -4652,7 +4544,7 @@
           <p:nvPr/>
         </p:nvPicPr>
         <p:blipFill rotWithShape="1">
-          <a:blip r:embed="rId6">
+          <a:blip r:embed="rId4">
             <a:clrChange>
               <a:clrFrom>
                 <a:srgbClr val="FFFFFF"/>
@@ -4682,100 +4574,231 @@
           </a:prstGeom>
         </p:spPr>
       </p:pic>
-      <p:pic>
-        <p:nvPicPr>
-          <p:cNvPr id="7172" name="Picture 4">
+      <p:grpSp>
+        <p:nvGrpSpPr>
+          <p:cNvPr id="3" name="Group 2">
             <a:extLst>
               <a:ext uri="{FF2B5EF4-FFF2-40B4-BE49-F238E27FC236}">
-                <a16:creationId xmlns:a16="http://schemas.microsoft.com/office/drawing/2014/main" id="{AC55B35B-79DF-46B5-9AA5-9CCC2676C9F5}"/>
+                <a16:creationId xmlns:a16="http://schemas.microsoft.com/office/drawing/2014/main" id="{5FEF3B9C-6F37-4BCD-A1E1-CF4211F05034}"/>
               </a:ext>
             </a:extLst>
           </p:cNvPr>
-          <p:cNvPicPr>
-            <a:picLocks noChangeAspect="1" noChangeArrowheads="1"/>
-          </p:cNvPicPr>
+          <p:cNvGrpSpPr/>
           <p:nvPr/>
-        </p:nvPicPr>
-        <p:blipFill>
-          <a:blip r:embed="rId7">
-            <a:extLst>
-              <a:ext uri="{28A0092B-C50C-407E-A947-70E740481C1C}">
-                <a14:useLocalDpi xmlns:a14="http://schemas.microsoft.com/office/drawing/2010/main" val="0"/>
-              </a:ext>
-            </a:extLst>
-          </a:blip>
-          <a:srcRect/>
-          <a:stretch>
-            <a:fillRect/>
-          </a:stretch>
-        </p:blipFill>
-        <p:spPr bwMode="auto">
+        </p:nvGrpSpPr>
+        <p:grpSpPr>
           <a:xfrm>
-            <a:off x="6854554" y="2529720"/>
-            <a:ext cx="4619583" cy="953928"/>
+            <a:off x="1872568" y="2196282"/>
+            <a:ext cx="9601569" cy="2225053"/>
+            <a:chOff x="1872568" y="2196282"/>
+            <a:chExt cx="9601569" cy="2225053"/>
           </a:xfrm>
-          <a:prstGeom prst="rect">
-            <a:avLst/>
-          </a:prstGeom>
-          <a:noFill/>
-          <a:extLst>
-            <a:ext uri="{909E8E84-426E-40DD-AFC4-6F175D3DCCD1}">
-              <a14:hiddenFill xmlns:a14="http://schemas.microsoft.com/office/drawing/2010/main">
-                <a:solidFill>
+        </p:grpSpPr>
+        <p:pic>
+          <p:nvPicPr>
+            <p:cNvPr id="6" name="Content Placeholder 4">
+              <a:extLst>
+                <a:ext uri="{FF2B5EF4-FFF2-40B4-BE49-F238E27FC236}">
+                  <a16:creationId xmlns:a16="http://schemas.microsoft.com/office/drawing/2014/main" id="{6B5C51E6-1957-40C7-AF4D-118278977155}"/>
+                </a:ext>
+              </a:extLst>
+            </p:cNvPr>
+            <p:cNvPicPr>
+              <a:picLocks noChangeAspect="1"/>
+            </p:cNvPicPr>
+            <p:nvPr/>
+          </p:nvPicPr>
+          <p:blipFill>
+            <a:blip r:embed="rId5">
+              <a:clrChange>
+                <a:clrFrom>
                   <a:srgbClr val="FFFFFF"/>
-                </a:solidFill>
-              </a14:hiddenFill>
-            </a:ext>
-          </a:extLst>
-        </p:spPr>
-      </p:pic>
-      <p:pic>
-        <p:nvPicPr>
-          <p:cNvPr id="7174" name="Picture 6">
-            <a:extLst>
-              <a:ext uri="{FF2B5EF4-FFF2-40B4-BE49-F238E27FC236}">
-                <a16:creationId xmlns:a16="http://schemas.microsoft.com/office/drawing/2014/main" id="{DF6A5E34-9D6E-4160-BC07-EF7C88ED7804}"/>
-              </a:ext>
-            </a:extLst>
-          </p:cNvPr>
-          <p:cNvPicPr>
-            <a:picLocks noChangeAspect="1" noChangeArrowheads="1"/>
-          </p:cNvPicPr>
-          <p:nvPr/>
-        </p:nvPicPr>
-        <p:blipFill>
-          <a:blip r:embed="rId8">
-            <a:extLst>
-              <a:ext uri="{28A0092B-C50C-407E-A947-70E740481C1C}">
-                <a14:useLocalDpi xmlns:a14="http://schemas.microsoft.com/office/drawing/2010/main" val="0"/>
-              </a:ext>
-            </a:extLst>
-          </a:blip>
-          <a:srcRect/>
-          <a:stretch>
-            <a:fillRect/>
-          </a:stretch>
-        </p:blipFill>
-        <p:spPr bwMode="auto">
-          <a:xfrm>
-            <a:off x="6854554" y="3866893"/>
-            <a:ext cx="2328357" cy="455787"/>
-          </a:xfrm>
-          <a:prstGeom prst="rect">
-            <a:avLst/>
-          </a:prstGeom>
-          <a:noFill/>
-          <a:extLst>
-            <a:ext uri="{909E8E84-426E-40DD-AFC4-6F175D3DCCD1}">
-              <a14:hiddenFill xmlns:a14="http://schemas.microsoft.com/office/drawing/2010/main">
-                <a:solidFill>
-                  <a:srgbClr val="FFFFFF"/>
-                </a:solidFill>
-              </a14:hiddenFill>
-            </a:ext>
-          </a:extLst>
-        </p:spPr>
-      </p:pic>
+                </a:clrFrom>
+                <a:clrTo>
+                  <a:srgbClr val="FFFFFF">
+                    <a:alpha val="0"/>
+                  </a:srgbClr>
+                </a:clrTo>
+              </a:clrChange>
+              <a:extLst>
+                <a:ext uri="{BEBA8EAE-BF5A-486C-A8C5-ECC9F3942E4B}">
+                  <a14:imgProps xmlns:a14="http://schemas.microsoft.com/office/drawing/2010/main">
+                    <a14:imgLayer r:embed="rId6">
+                      <a14:imgEffect>
+                        <a14:backgroundRemoval t="5160" b="94349" l="2012" r="99882">
+                          <a14:foregroundMark x1="64465" y1="13163" x2="66036" y2="18673"/>
+                          <a14:foregroundMark x1="63444" y1="9582" x2="64421" y2="13010"/>
+                          <a14:foregroundMark x1="62604" y1="6634" x2="63444" y2="9582"/>
+                          <a14:foregroundMark x1="71720" y1="18933" x2="74399" y2="19055"/>
+                          <a14:foregroundMark x1="70764" y1="18889" x2="71256" y2="18911"/>
+                          <a14:foregroundMark x1="67569" y1="18743" x2="69160" y2="18816"/>
+                          <a14:foregroundMark x1="66036" y1="18673" x2="66784" y2="18707"/>
+                          <a14:foregroundMark x1="78728" y1="18677" x2="92308" y2="15233"/>
+                          <a14:foregroundMark x1="92308" y1="15233" x2="98935" y2="63882"/>
+                          <a14:foregroundMark x1="98935" y1="63882" x2="94793" y2="78133"/>
+                          <a14:foregroundMark x1="94793" y1="78133" x2="87929" y2="87715"/>
+                          <a14:foregroundMark x1="73599" y1="88404" x2="11243" y2="91400"/>
+                          <a14:foregroundMark x1="87929" y1="87715" x2="73611" y2="88403"/>
+                          <a14:foregroundMark x1="11243" y1="91400" x2="4379" y2="79607"/>
+                          <a14:foregroundMark x1="4379" y1="79607" x2="1302" y2="38329"/>
+                          <a14:foregroundMark x1="1302" y1="38329" x2="5325" y2="20393"/>
+                          <a14:foregroundMark x1="5325" y1="20393" x2="10059" y2="9091"/>
+                          <a14:foregroundMark x1="10059" y1="9091" x2="48639" y2="15971"/>
+                          <a14:foregroundMark x1="48639" y1="15971" x2="54675" y2="3194"/>
+                          <a14:foregroundMark x1="54675" y1="3194" x2="62722" y2="5651"/>
+                          <a14:foregroundMark x1="62722" y1="5651" x2="63077" y2="6634"/>
+                          <a14:foregroundMark x1="14556" y1="6634" x2="2722" y2="21376"/>
+                          <a14:foregroundMark x1="2722" y1="21376" x2="4497" y2="74447"/>
+                          <a14:foregroundMark x1="4497" y1="74447" x2="16923" y2="90172"/>
+                          <a14:foregroundMark x1="16923" y1="90172" x2="27692" y2="24816"/>
+                          <a14:foregroundMark x1="27692" y1="24816" x2="18107" y2="11302"/>
+                          <a14:foregroundMark x1="18107" y1="11302" x2="15266" y2="11302"/>
+                          <a14:foregroundMark x1="11834" y1="10319" x2="7929" y2="22359"/>
+                          <a14:foregroundMark x1="7929" y1="22359" x2="4024" y2="55528"/>
+                          <a14:foregroundMark x1="8402" y1="20885" x2="2130" y2="70516"/>
+                          <a14:foregroundMark x1="90414" y1="34152" x2="95503" y2="45946"/>
+                          <a14:foregroundMark x1="95503" y1="45946" x2="91716" y2="70762"/>
+                          <a14:foregroundMark x1="54793" y1="84521" x2="56805" y2="94349"/>
+                          <a14:foregroundMark x1="92189" y1="27273" x2="99882" y2="35381"/>
+                          <a14:foregroundMark x1="55030" y1="56757" x2="39053" y2="85749"/>
+                          <a14:foregroundMark x1="30178" y1="42752" x2="11834" y2="77150"/>
+                          <a14:foregroundMark x1="20828" y1="26044" x2="13491" y2="31941"/>
+                          <a14:foregroundMark x1="63905" y1="53317" x2="55976" y2="56511"/>
+                          <a14:foregroundMark x1="55976" y1="56511" x2="45207" y2="48894"/>
+                          <a14:foregroundMark x1="63077" y1="41769" x2="53018" y2="67568"/>
+                          <a14:foregroundMark x1="60710" y1="37592" x2="74320" y2="63636"/>
+                          <a14:backgroundMark x1="65799" y1="6388" x2="71479" y2="17690"/>
+                          <a14:backgroundMark x1="71479" y1="17690" x2="66982" y2="5405"/>
+                          <a14:backgroundMark x1="66982" y1="5405" x2="66627" y2="8600"/>
+                          <a14:backgroundMark x1="65799" y1="6880" x2="68757" y2="17445"/>
+                          <a14:backgroundMark x1="68876" y1="13514" x2="65325" y2="7125"/>
+                          <a14:backgroundMark x1="72308" y1="6143" x2="68994" y2="13022"/>
+                          <a14:backgroundMark x1="70651" y1="5405" x2="76568" y2="17690"/>
+                          <a14:backgroundMark x1="76568" y1="17690" x2="77278" y2="24570"/>
+                          <a14:backgroundMark x1="68284" y1="71744" x2="62959" y2="82801"/>
+                          <a14:backgroundMark x1="62959" y1="82801" x2="73018" y2="85012"/>
+                          <a14:backgroundMark x1="73018" y1="85012" x2="69467" y2="67076"/>
+                          <a14:backgroundMark x1="69467" y1="67076" x2="64615" y2="74447"/>
+                          <a14:backgroundMark x1="64615" y1="74447" x2="64497" y2="76413"/>
+                          <a14:backgroundMark x1="64970" y1="7371" x2="65207" y2="10074"/>
+                          <a14:backgroundMark x1="65325" y1="9582" x2="65325" y2="9582"/>
+                          <a14:backgroundMark x1="64970" y1="10074" x2="65325" y2="6388"/>
+                        </a14:backgroundRemoval>
+                      </a14:imgEffect>
+                    </a14:imgLayer>
+                  </a14:imgProps>
+                </a:ext>
+              </a:extLst>
+            </a:blip>
+            <a:stretch>
+              <a:fillRect/>
+            </a:stretch>
+          </p:blipFill>
+          <p:spPr>
+            <a:xfrm>
+              <a:off x="1872568" y="2196282"/>
+              <a:ext cx="4619582" cy="2225053"/>
+            </a:xfrm>
+            <a:prstGeom prst="rect">
+              <a:avLst/>
+            </a:prstGeom>
+          </p:spPr>
+        </p:pic>
+        <p:pic>
+          <p:nvPicPr>
+            <p:cNvPr id="7172" name="Picture 4">
+              <a:extLst>
+                <a:ext uri="{FF2B5EF4-FFF2-40B4-BE49-F238E27FC236}">
+                  <a16:creationId xmlns:a16="http://schemas.microsoft.com/office/drawing/2014/main" id="{AC55B35B-79DF-46B5-9AA5-9CCC2676C9F5}"/>
+                </a:ext>
+              </a:extLst>
+            </p:cNvPr>
+            <p:cNvPicPr>
+              <a:picLocks noChangeAspect="1" noChangeArrowheads="1"/>
+            </p:cNvPicPr>
+            <p:nvPr/>
+          </p:nvPicPr>
+          <p:blipFill>
+            <a:blip r:embed="rId7">
+              <a:extLst>
+                <a:ext uri="{28A0092B-C50C-407E-A947-70E740481C1C}">
+                  <a14:useLocalDpi xmlns:a14="http://schemas.microsoft.com/office/drawing/2010/main" val="0"/>
+                </a:ext>
+              </a:extLst>
+            </a:blip>
+            <a:srcRect/>
+            <a:stretch>
+              <a:fillRect/>
+            </a:stretch>
+          </p:blipFill>
+          <p:spPr bwMode="auto">
+            <a:xfrm>
+              <a:off x="6854554" y="2529720"/>
+              <a:ext cx="4619583" cy="953928"/>
+            </a:xfrm>
+            <a:prstGeom prst="rect">
+              <a:avLst/>
+            </a:prstGeom>
+            <a:noFill/>
+            <a:extLst>
+              <a:ext uri="{909E8E84-426E-40DD-AFC4-6F175D3DCCD1}">
+                <a14:hiddenFill xmlns:a14="http://schemas.microsoft.com/office/drawing/2010/main">
+                  <a:solidFill>
+                    <a:srgbClr val="FFFFFF"/>
+                  </a:solidFill>
+                </a14:hiddenFill>
+              </a:ext>
+            </a:extLst>
+          </p:spPr>
+        </p:pic>
+        <p:pic>
+          <p:nvPicPr>
+            <p:cNvPr id="7174" name="Picture 6">
+              <a:extLst>
+                <a:ext uri="{FF2B5EF4-FFF2-40B4-BE49-F238E27FC236}">
+                  <a16:creationId xmlns:a16="http://schemas.microsoft.com/office/drawing/2014/main" id="{DF6A5E34-9D6E-4160-BC07-EF7C88ED7804}"/>
+                </a:ext>
+              </a:extLst>
+            </p:cNvPr>
+            <p:cNvPicPr>
+              <a:picLocks noChangeAspect="1" noChangeArrowheads="1"/>
+            </p:cNvPicPr>
+            <p:nvPr/>
+          </p:nvPicPr>
+          <p:blipFill>
+            <a:blip r:embed="rId8">
+              <a:extLst>
+                <a:ext uri="{28A0092B-C50C-407E-A947-70E740481C1C}">
+                  <a14:useLocalDpi xmlns:a14="http://schemas.microsoft.com/office/drawing/2010/main" val="0"/>
+                </a:ext>
+              </a:extLst>
+            </a:blip>
+            <a:srcRect/>
+            <a:stretch>
+              <a:fillRect/>
+            </a:stretch>
+          </p:blipFill>
+          <p:spPr bwMode="auto">
+            <a:xfrm>
+              <a:off x="6854554" y="3866893"/>
+              <a:ext cx="2328357" cy="455787"/>
+            </a:xfrm>
+            <a:prstGeom prst="rect">
+              <a:avLst/>
+            </a:prstGeom>
+            <a:noFill/>
+            <a:extLst>
+              <a:ext uri="{909E8E84-426E-40DD-AFC4-6F175D3DCCD1}">
+                <a14:hiddenFill xmlns:a14="http://schemas.microsoft.com/office/drawing/2010/main">
+                  <a:solidFill>
+                    <a:srgbClr val="FFFFFF"/>
+                  </a:solidFill>
+                </a14:hiddenFill>
+              </a:ext>
+            </a:extLst>
+          </p:spPr>
+        </p:pic>
+      </p:grpSp>
       <p:sp>
         <p:nvSpPr>
           <p:cNvPr id="10" name="Rectangle 9">
@@ -5151,327 +5174,348 @@
           </a:p>
         </p:txBody>
       </p:sp>
-      <p:pic>
-        <p:nvPicPr>
-          <p:cNvPr id="7" name="Picture 6">
+      <p:grpSp>
+        <p:nvGrpSpPr>
+          <p:cNvPr id="3" name="Group 2">
             <a:extLst>
               <a:ext uri="{FF2B5EF4-FFF2-40B4-BE49-F238E27FC236}">
-                <a16:creationId xmlns:a16="http://schemas.microsoft.com/office/drawing/2014/main" id="{D173BD1E-BF7B-4CF3-A1D5-F7DD59888077}"/>
+                <a16:creationId xmlns:a16="http://schemas.microsoft.com/office/drawing/2014/main" id="{A1D16B8C-C4E5-4589-9D19-A02041D4728D}"/>
               </a:ext>
             </a:extLst>
           </p:cNvPr>
-          <p:cNvPicPr>
-            <a:picLocks noChangeAspect="1"/>
-          </p:cNvPicPr>
+          <p:cNvGrpSpPr/>
           <p:nvPr/>
-        </p:nvPicPr>
-        <p:blipFill>
-          <a:blip r:embed="rId2"/>
-          <a:stretch>
-            <a:fillRect/>
-          </a:stretch>
-        </p:blipFill>
-        <p:spPr>
+        </p:nvGrpSpPr>
+        <p:grpSpPr>
           <a:xfrm>
-            <a:off x="2257688" y="2498903"/>
-            <a:ext cx="3843756" cy="1625500"/>
+            <a:off x="1637346" y="2498903"/>
+            <a:ext cx="9169447" cy="2274606"/>
+            <a:chOff x="1637346" y="2498903"/>
+            <a:chExt cx="9169447" cy="2274606"/>
           </a:xfrm>
-          <a:prstGeom prst="rect">
-            <a:avLst/>
-          </a:prstGeom>
-        </p:spPr>
-      </p:pic>
-      <p:pic>
-        <p:nvPicPr>
-          <p:cNvPr id="9" name="Picture 8">
-            <a:extLst>
-              <a:ext uri="{FF2B5EF4-FFF2-40B4-BE49-F238E27FC236}">
-                <a16:creationId xmlns:a16="http://schemas.microsoft.com/office/drawing/2014/main" id="{D9E681EF-337B-467B-AE50-D914C29011A6}"/>
-              </a:ext>
-            </a:extLst>
-          </p:cNvPr>
-          <p:cNvPicPr>
-            <a:picLocks noChangeAspect="1"/>
-          </p:cNvPicPr>
-          <p:nvPr/>
-        </p:nvPicPr>
-        <p:blipFill>
-          <a:blip r:embed="rId3"/>
-          <a:stretch>
-            <a:fillRect/>
-          </a:stretch>
-        </p:blipFill>
-        <p:spPr>
-          <a:xfrm>
-            <a:off x="6310366" y="2628821"/>
-            <a:ext cx="4496427" cy="1124107"/>
-          </a:xfrm>
-          <a:prstGeom prst="rect">
-            <a:avLst/>
-          </a:prstGeom>
-        </p:spPr>
-      </p:pic>
-      <p:pic>
-        <p:nvPicPr>
-          <p:cNvPr id="11" name="Picture 10">
-            <a:extLst>
-              <a:ext uri="{FF2B5EF4-FFF2-40B4-BE49-F238E27FC236}">
-                <a16:creationId xmlns:a16="http://schemas.microsoft.com/office/drawing/2014/main" id="{A83B0E42-B653-4EF4-B64A-5E566D6633F9}"/>
-              </a:ext>
-            </a:extLst>
-          </p:cNvPr>
-          <p:cNvPicPr>
-            <a:picLocks noChangeAspect="1"/>
-          </p:cNvPicPr>
-          <p:nvPr/>
-        </p:nvPicPr>
-        <p:blipFill>
-          <a:blip r:embed="rId4"/>
-          <a:stretch>
-            <a:fillRect/>
-          </a:stretch>
-        </p:blipFill>
-        <p:spPr>
-          <a:xfrm>
-            <a:off x="7863383" y="3883895"/>
-            <a:ext cx="2353003" cy="704948"/>
-          </a:xfrm>
-          <a:prstGeom prst="rect">
-            <a:avLst/>
-          </a:prstGeom>
-        </p:spPr>
-      </p:pic>
-      <p:sp>
-        <p:nvSpPr>
-          <p:cNvPr id="13" name="Right Brace 12">
-            <a:extLst>
-              <a:ext uri="{FF2B5EF4-FFF2-40B4-BE49-F238E27FC236}">
-                <a16:creationId xmlns:a16="http://schemas.microsoft.com/office/drawing/2014/main" id="{AA53E128-A4CC-4407-AD33-D8A593C3DA95}"/>
-              </a:ext>
-            </a:extLst>
-          </p:cNvPr>
-          <p:cNvSpPr/>
-          <p:nvPr/>
-        </p:nvSpPr>
-        <p:spPr>
-          <a:xfrm rot="16200000" flipH="1">
-            <a:off x="8908918" y="2104665"/>
-            <a:ext cx="261935" cy="3296525"/>
-          </a:xfrm>
-          <a:prstGeom prst="rightBrace">
-            <a:avLst>
-              <a:gd name="adj1" fmla="val 128249"/>
-              <a:gd name="adj2" fmla="val 50000"/>
-            </a:avLst>
-          </a:prstGeom>
-        </p:spPr>
-        <p:style>
-          <a:lnRef idx="3">
-            <a:schemeClr val="dk1"/>
-          </a:lnRef>
-          <a:fillRef idx="0">
-            <a:schemeClr val="dk1"/>
-          </a:fillRef>
-          <a:effectRef idx="2">
-            <a:schemeClr val="dk1"/>
-          </a:effectRef>
-          <a:fontRef idx="minor">
-            <a:schemeClr val="tx1"/>
-          </a:fontRef>
-        </p:style>
-        <p:txBody>
-          <a:bodyPr rtlCol="0" anchor="ctr"/>
-          <a:lstStyle/>
-          <a:p>
-            <a:pPr algn="ctr"/>
-            <a:endParaRPr lang="en-US"/>
-          </a:p>
-        </p:txBody>
-      </p:sp>
-      <p:pic>
-        <p:nvPicPr>
-          <p:cNvPr id="2050" name="Picture 2">
-            <a:extLst>
-              <a:ext uri="{FF2B5EF4-FFF2-40B4-BE49-F238E27FC236}">
-                <a16:creationId xmlns:a16="http://schemas.microsoft.com/office/drawing/2014/main" id="{188ED6E2-5C1B-46D1-9118-6A87C5153DCF}"/>
-              </a:ext>
-            </a:extLst>
-          </p:cNvPr>
-          <p:cNvPicPr>
-            <a:picLocks noChangeAspect="1" noChangeArrowheads="1"/>
-          </p:cNvPicPr>
-          <p:nvPr/>
-        </p:nvPicPr>
-        <p:blipFill>
-          <a:blip r:embed="rId5">
-            <a:extLst>
-              <a:ext uri="{28A0092B-C50C-407E-A947-70E740481C1C}">
-                <a14:useLocalDpi xmlns:a14="http://schemas.microsoft.com/office/drawing/2010/main" val="0"/>
-              </a:ext>
-            </a:extLst>
-          </a:blip>
-          <a:srcRect/>
-          <a:stretch>
-            <a:fillRect/>
-          </a:stretch>
-        </p:blipFill>
-        <p:spPr bwMode="auto">
-          <a:xfrm>
-            <a:off x="2434388" y="4439982"/>
-            <a:ext cx="1117327" cy="297720"/>
-          </a:xfrm>
-          <a:prstGeom prst="rect">
-            <a:avLst/>
-          </a:prstGeom>
-          <a:noFill/>
-          <a:extLst>
-            <a:ext uri="{909E8E84-426E-40DD-AFC4-6F175D3DCCD1}">
-              <a14:hiddenFill xmlns:a14="http://schemas.microsoft.com/office/drawing/2010/main">
-                <a:solidFill>
-                  <a:srgbClr val="FFFFFF"/>
-                </a:solidFill>
-              </a14:hiddenFill>
-            </a:ext>
-          </a:extLst>
-        </p:spPr>
-      </p:pic>
-      <mc:AlternateContent xmlns:mc="http://schemas.openxmlformats.org/markup-compatibility/2006" xmlns:a14="http://schemas.microsoft.com/office/drawing/2010/main">
-        <mc:Choice Requires="a14">
-          <p:sp>
-            <p:nvSpPr>
-              <p:cNvPr id="14" name="TextBox 13">
-                <a:extLst>
-                  <a:ext uri="{FF2B5EF4-FFF2-40B4-BE49-F238E27FC236}">
-                    <a16:creationId xmlns:a16="http://schemas.microsoft.com/office/drawing/2014/main" id="{BF0464D8-205D-4CD0-AEB2-3A7498F5FF0A}"/>
-                  </a:ext>
-                </a:extLst>
-              </p:cNvPr>
-              <p:cNvSpPr txBox="1"/>
-              <p:nvPr/>
-            </p:nvSpPr>
-            <p:spPr>
-              <a:xfrm>
-                <a:off x="3573591" y="4404177"/>
-                <a:ext cx="3749553" cy="369332"/>
-              </a:xfrm>
-              <a:prstGeom prst="rect">
-                <a:avLst/>
-              </a:prstGeom>
-              <a:noFill/>
-            </p:spPr>
-            <p:txBody>
-              <a:bodyPr wrap="none" rtlCol="0">
-                <a:spAutoFit/>
-              </a:bodyPr>
-              <a:lstStyle/>
-              <a:p>
-                <a:r>
-                  <a:rPr lang="en-US" dirty="0"/>
-                  <a:t>is a unit Gaussian on </a:t>
-                </a:r>
-                <a:r>
-                  <a:rPr lang="en-US" b="1" i="1" dirty="0"/>
-                  <a:t>Y</a:t>
-                </a:r>
-                <a:r>
-                  <a:rPr lang="en-US" dirty="0"/>
-                  <a:t>  with mean </a:t>
-                </a:r>
-                <a14:m>
-                  <m:oMath xmlns:m="http://schemas.openxmlformats.org/officeDocument/2006/math">
-                    <m:r>
-                      <a:rPr lang="en-US" b="0" i="1" smtClean="0">
-                        <a:latin typeface="Cambria Math" panose="02040503050406030204" pitchFamily="18" charset="0"/>
-                      </a:rPr>
-                      <m:t>𝜇</m:t>
-                    </m:r>
-                  </m:oMath>
-                </a14:m>
-                <a:endParaRPr lang="en-US" dirty="0"/>
-              </a:p>
-            </p:txBody>
-          </p:sp>
-        </mc:Choice>
-        <mc:Fallback xmlns="">
-          <p:sp>
-            <p:nvSpPr>
-              <p:cNvPr id="14" name="TextBox 13">
-                <a:extLst>
-                  <a:ext uri="{FF2B5EF4-FFF2-40B4-BE49-F238E27FC236}">
-                    <a16:creationId xmlns:a16="http://schemas.microsoft.com/office/drawing/2014/main" id="{BF0464D8-205D-4CD0-AEB2-3A7498F5FF0A}"/>
-                  </a:ext>
-                </a:extLst>
-              </p:cNvPr>
-              <p:cNvSpPr txBox="1">
-                <a:spLocks noRot="1" noChangeAspect="1" noMove="1" noResize="1" noEditPoints="1" noAdjustHandles="1" noChangeArrowheads="1" noChangeShapeType="1" noTextEdit="1"/>
-              </p:cNvSpPr>
-              <p:nvPr/>
-            </p:nvSpPr>
-            <p:spPr>
-              <a:xfrm>
-                <a:off x="3573591" y="4404177"/>
-                <a:ext cx="3749553" cy="369332"/>
-              </a:xfrm>
-              <a:prstGeom prst="rect">
-                <a:avLst/>
-              </a:prstGeom>
-              <a:blipFill>
-                <a:blip r:embed="rId6"/>
-                <a:stretch>
-                  <a:fillRect l="-1301" t="-8197" b="-24590"/>
-                </a:stretch>
-              </a:blipFill>
-            </p:spPr>
-            <p:txBody>
-              <a:bodyPr/>
-              <a:lstStyle/>
-              <a:p>
-                <a:r>
-                  <a:rPr lang="en-US">
-                    <a:noFill/>
-                  </a:rPr>
-                  <a:t> </a:t>
-                </a:r>
-              </a:p>
-            </p:txBody>
-          </p:sp>
-        </mc:Fallback>
-      </mc:AlternateContent>
-      <p:sp>
-        <p:nvSpPr>
-          <p:cNvPr id="17" name="TextBox 16">
-            <a:extLst>
-              <a:ext uri="{FF2B5EF4-FFF2-40B4-BE49-F238E27FC236}">
-                <a16:creationId xmlns:a16="http://schemas.microsoft.com/office/drawing/2014/main" id="{0DFC04F6-EECF-4175-8A61-D882C11FAC8A}"/>
-              </a:ext>
-            </a:extLst>
-          </p:cNvPr>
-          <p:cNvSpPr txBox="1"/>
-          <p:nvPr/>
-        </p:nvSpPr>
-        <p:spPr>
-          <a:xfrm>
-            <a:off x="1637346" y="4404176"/>
-            <a:ext cx="1055276" cy="369332"/>
-          </a:xfrm>
-          <a:prstGeom prst="rect">
-            <a:avLst/>
-          </a:prstGeom>
-          <a:noFill/>
-        </p:spPr>
-        <p:txBody>
-          <a:bodyPr wrap="square">
-            <a:spAutoFit/>
-          </a:bodyPr>
-          <a:lstStyle/>
-          <a:p>
-            <a:r>
-              <a:rPr lang="en-US" dirty="0"/>
-              <a:t>where</a:t>
-            </a:r>
-          </a:p>
-        </p:txBody>
-      </p:sp>
+        </p:grpSpPr>
+        <p:pic>
+          <p:nvPicPr>
+            <p:cNvPr id="7" name="Picture 6">
+              <a:extLst>
+                <a:ext uri="{FF2B5EF4-FFF2-40B4-BE49-F238E27FC236}">
+                  <a16:creationId xmlns:a16="http://schemas.microsoft.com/office/drawing/2014/main" id="{D173BD1E-BF7B-4CF3-A1D5-F7DD59888077}"/>
+                </a:ext>
+              </a:extLst>
+            </p:cNvPr>
+            <p:cNvPicPr>
+              <a:picLocks noChangeAspect="1"/>
+            </p:cNvPicPr>
+            <p:nvPr/>
+          </p:nvPicPr>
+          <p:blipFill>
+            <a:blip r:embed="rId2"/>
+            <a:stretch>
+              <a:fillRect/>
+            </a:stretch>
+          </p:blipFill>
+          <p:spPr>
+            <a:xfrm>
+              <a:off x="2257688" y="2498903"/>
+              <a:ext cx="3843756" cy="1625500"/>
+            </a:xfrm>
+            <a:prstGeom prst="rect">
+              <a:avLst/>
+            </a:prstGeom>
+          </p:spPr>
+        </p:pic>
+        <p:pic>
+          <p:nvPicPr>
+            <p:cNvPr id="9" name="Picture 8">
+              <a:extLst>
+                <a:ext uri="{FF2B5EF4-FFF2-40B4-BE49-F238E27FC236}">
+                  <a16:creationId xmlns:a16="http://schemas.microsoft.com/office/drawing/2014/main" id="{D9E681EF-337B-467B-AE50-D914C29011A6}"/>
+                </a:ext>
+              </a:extLst>
+            </p:cNvPr>
+            <p:cNvPicPr>
+              <a:picLocks noChangeAspect="1"/>
+            </p:cNvPicPr>
+            <p:nvPr/>
+          </p:nvPicPr>
+          <p:blipFill>
+            <a:blip r:embed="rId3"/>
+            <a:stretch>
+              <a:fillRect/>
+            </a:stretch>
+          </p:blipFill>
+          <p:spPr>
+            <a:xfrm>
+              <a:off x="6310366" y="2628821"/>
+              <a:ext cx="4496427" cy="1124107"/>
+            </a:xfrm>
+            <a:prstGeom prst="rect">
+              <a:avLst/>
+            </a:prstGeom>
+          </p:spPr>
+        </p:pic>
+        <p:pic>
+          <p:nvPicPr>
+            <p:cNvPr id="11" name="Picture 10">
+              <a:extLst>
+                <a:ext uri="{FF2B5EF4-FFF2-40B4-BE49-F238E27FC236}">
+                  <a16:creationId xmlns:a16="http://schemas.microsoft.com/office/drawing/2014/main" id="{A83B0E42-B653-4EF4-B64A-5E566D6633F9}"/>
+                </a:ext>
+              </a:extLst>
+            </p:cNvPr>
+            <p:cNvPicPr>
+              <a:picLocks noChangeAspect="1"/>
+            </p:cNvPicPr>
+            <p:nvPr/>
+          </p:nvPicPr>
+          <p:blipFill>
+            <a:blip r:embed="rId4"/>
+            <a:stretch>
+              <a:fillRect/>
+            </a:stretch>
+          </p:blipFill>
+          <p:spPr>
+            <a:xfrm>
+              <a:off x="7863383" y="3883895"/>
+              <a:ext cx="2353003" cy="704948"/>
+            </a:xfrm>
+            <a:prstGeom prst="rect">
+              <a:avLst/>
+            </a:prstGeom>
+          </p:spPr>
+        </p:pic>
+        <p:sp>
+          <p:nvSpPr>
+            <p:cNvPr id="13" name="Right Brace 12">
+              <a:extLst>
+                <a:ext uri="{FF2B5EF4-FFF2-40B4-BE49-F238E27FC236}">
+                  <a16:creationId xmlns:a16="http://schemas.microsoft.com/office/drawing/2014/main" id="{AA53E128-A4CC-4407-AD33-D8A593C3DA95}"/>
+                </a:ext>
+              </a:extLst>
+            </p:cNvPr>
+            <p:cNvSpPr/>
+            <p:nvPr/>
+          </p:nvSpPr>
+          <p:spPr>
+            <a:xfrm rot="16200000" flipH="1">
+              <a:off x="8908918" y="2104665"/>
+              <a:ext cx="261935" cy="3296525"/>
+            </a:xfrm>
+            <a:prstGeom prst="rightBrace">
+              <a:avLst>
+                <a:gd name="adj1" fmla="val 128249"/>
+                <a:gd name="adj2" fmla="val 50000"/>
+              </a:avLst>
+            </a:prstGeom>
+          </p:spPr>
+          <p:style>
+            <a:lnRef idx="3">
+              <a:schemeClr val="dk1"/>
+            </a:lnRef>
+            <a:fillRef idx="0">
+              <a:schemeClr val="dk1"/>
+            </a:fillRef>
+            <a:effectRef idx="2">
+              <a:schemeClr val="dk1"/>
+            </a:effectRef>
+            <a:fontRef idx="minor">
+              <a:schemeClr val="tx1"/>
+            </a:fontRef>
+          </p:style>
+          <p:txBody>
+            <a:bodyPr rtlCol="0" anchor="ctr"/>
+            <a:lstStyle/>
+            <a:p>
+              <a:pPr algn="ctr"/>
+              <a:endParaRPr lang="en-US"/>
+            </a:p>
+          </p:txBody>
+        </p:sp>
+        <p:pic>
+          <p:nvPicPr>
+            <p:cNvPr id="2050" name="Picture 2">
+              <a:extLst>
+                <a:ext uri="{FF2B5EF4-FFF2-40B4-BE49-F238E27FC236}">
+                  <a16:creationId xmlns:a16="http://schemas.microsoft.com/office/drawing/2014/main" id="{188ED6E2-5C1B-46D1-9118-6A87C5153DCF}"/>
+                </a:ext>
+              </a:extLst>
+            </p:cNvPr>
+            <p:cNvPicPr>
+              <a:picLocks noChangeAspect="1" noChangeArrowheads="1"/>
+            </p:cNvPicPr>
+            <p:nvPr/>
+          </p:nvPicPr>
+          <p:blipFill>
+            <a:blip r:embed="rId5">
+              <a:extLst>
+                <a:ext uri="{28A0092B-C50C-407E-A947-70E740481C1C}">
+                  <a14:useLocalDpi xmlns:a14="http://schemas.microsoft.com/office/drawing/2010/main" val="0"/>
+                </a:ext>
+              </a:extLst>
+            </a:blip>
+            <a:srcRect/>
+            <a:stretch>
+              <a:fillRect/>
+            </a:stretch>
+          </p:blipFill>
+          <p:spPr bwMode="auto">
+            <a:xfrm>
+              <a:off x="2434388" y="4439982"/>
+              <a:ext cx="1117327" cy="297720"/>
+            </a:xfrm>
+            <a:prstGeom prst="rect">
+              <a:avLst/>
+            </a:prstGeom>
+            <a:noFill/>
+            <a:extLst>
+              <a:ext uri="{909E8E84-426E-40DD-AFC4-6F175D3DCCD1}">
+                <a14:hiddenFill xmlns:a14="http://schemas.microsoft.com/office/drawing/2010/main">
+                  <a:solidFill>
+                    <a:srgbClr val="FFFFFF"/>
+                  </a:solidFill>
+                </a14:hiddenFill>
+              </a:ext>
+            </a:extLst>
+          </p:spPr>
+        </p:pic>
+        <mc:AlternateContent xmlns:mc="http://schemas.openxmlformats.org/markup-compatibility/2006">
+          <mc:Choice xmlns:a14="http://schemas.microsoft.com/office/drawing/2010/main" Requires="a14">
+            <p:sp>
+              <p:nvSpPr>
+                <p:cNvPr id="14" name="TextBox 13">
+                  <a:extLst>
+                    <a:ext uri="{FF2B5EF4-FFF2-40B4-BE49-F238E27FC236}">
+                      <a16:creationId xmlns:a16="http://schemas.microsoft.com/office/drawing/2014/main" id="{BF0464D8-205D-4CD0-AEB2-3A7498F5FF0A}"/>
+                    </a:ext>
+                  </a:extLst>
+                </p:cNvPr>
+                <p:cNvSpPr txBox="1"/>
+                <p:nvPr/>
+              </p:nvSpPr>
+              <p:spPr>
+                <a:xfrm>
+                  <a:off x="3573591" y="4404177"/>
+                  <a:ext cx="3749553" cy="369332"/>
+                </a:xfrm>
+                <a:prstGeom prst="rect">
+                  <a:avLst/>
+                </a:prstGeom>
+                <a:noFill/>
+              </p:spPr>
+              <p:txBody>
+                <a:bodyPr wrap="none" rtlCol="0">
+                  <a:spAutoFit/>
+                </a:bodyPr>
+                <a:lstStyle/>
+                <a:p>
+                  <a:r>
+                    <a:rPr lang="en-US" dirty="0"/>
+                    <a:t>is a unit Gaussian on </a:t>
+                  </a:r>
+                  <a:r>
+                    <a:rPr lang="en-US" b="1" i="1" dirty="0"/>
+                    <a:t>Y</a:t>
+                  </a:r>
+                  <a:r>
+                    <a:rPr lang="en-US" dirty="0"/>
+                    <a:t>  with mean </a:t>
+                  </a:r>
+                  <a14:m>
+                    <m:oMath xmlns:m="http://schemas.openxmlformats.org/officeDocument/2006/math">
+                      <m:r>
+                        <a:rPr lang="en-US" b="0" i="1" smtClean="0">
+                          <a:latin typeface="Cambria Math" panose="02040503050406030204" pitchFamily="18" charset="0"/>
+                        </a:rPr>
+                        <m:t>𝜇</m:t>
+                      </m:r>
+                    </m:oMath>
+                  </a14:m>
+                  <a:endParaRPr lang="en-US" dirty="0"/>
+                </a:p>
+              </p:txBody>
+            </p:sp>
+          </mc:Choice>
+          <mc:Fallback>
+            <p:sp>
+              <p:nvSpPr>
+                <p:cNvPr id="14" name="TextBox 13">
+                  <a:extLst>
+                    <a:ext uri="{FF2B5EF4-FFF2-40B4-BE49-F238E27FC236}">
+                      <a16:creationId xmlns:a16="http://schemas.microsoft.com/office/drawing/2014/main" id="{BF0464D8-205D-4CD0-AEB2-3A7498F5FF0A}"/>
+                    </a:ext>
+                  </a:extLst>
+                </p:cNvPr>
+                <p:cNvSpPr txBox="1">
+                  <a:spLocks noRot="1" noChangeAspect="1" noMove="1" noResize="1" noEditPoints="1" noAdjustHandles="1" noChangeArrowheads="1" noChangeShapeType="1" noTextEdit="1"/>
+                </p:cNvSpPr>
+                <p:nvPr/>
+              </p:nvSpPr>
+              <p:spPr>
+                <a:xfrm>
+                  <a:off x="3573591" y="4404177"/>
+                  <a:ext cx="3749553" cy="369332"/>
+                </a:xfrm>
+                <a:prstGeom prst="rect">
+                  <a:avLst/>
+                </a:prstGeom>
+                <a:blipFill>
+                  <a:blip r:embed="rId6"/>
+                  <a:stretch>
+                    <a:fillRect l="-1301" t="-8197" b="-24590"/>
+                  </a:stretch>
+                </a:blipFill>
+              </p:spPr>
+              <p:txBody>
+                <a:bodyPr/>
+                <a:lstStyle/>
+                <a:p>
+                  <a:r>
+                    <a:rPr lang="en-US">
+                      <a:noFill/>
+                    </a:rPr>
+                    <a:t> </a:t>
+                  </a:r>
+                </a:p>
+              </p:txBody>
+            </p:sp>
+          </mc:Fallback>
+        </mc:AlternateContent>
+        <p:sp>
+          <p:nvSpPr>
+            <p:cNvPr id="17" name="TextBox 16">
+              <a:extLst>
+                <a:ext uri="{FF2B5EF4-FFF2-40B4-BE49-F238E27FC236}">
+                  <a16:creationId xmlns:a16="http://schemas.microsoft.com/office/drawing/2014/main" id="{0DFC04F6-EECF-4175-8A61-D882C11FAC8A}"/>
+                </a:ext>
+              </a:extLst>
+            </p:cNvPr>
+            <p:cNvSpPr txBox="1"/>
+            <p:nvPr/>
+          </p:nvSpPr>
+          <p:spPr>
+            <a:xfrm>
+              <a:off x="1637346" y="4404176"/>
+              <a:ext cx="1055276" cy="369332"/>
+            </a:xfrm>
+            <a:prstGeom prst="rect">
+              <a:avLst/>
+            </a:prstGeom>
+            <a:noFill/>
+          </p:spPr>
+          <p:txBody>
+            <a:bodyPr wrap="square">
+              <a:spAutoFit/>
+            </a:bodyPr>
+            <a:lstStyle/>
+            <a:p>
+              <a:r>
+                <a:rPr lang="en-US" dirty="0"/>
+                <a:t>where</a:t>
+              </a:r>
+            </a:p>
+          </p:txBody>
+        </p:sp>
+      </p:grpSp>
       <p:sp>
         <p:nvSpPr>
           <p:cNvPr id="4" name="Slide Number Placeholder 3">
@@ -12903,6 +12947,150 @@
 </file>
 
 <file path=ppt/slides/slide17.xml><?xml version="1.0" encoding="utf-8"?>
+<p:sld xmlns:a="http://schemas.openxmlformats.org/drawingml/2006/main" xmlns:r="http://schemas.openxmlformats.org/officeDocument/2006/relationships" xmlns:p="http://schemas.openxmlformats.org/presentationml/2006/main">
+  <p:cSld>
+    <p:spTree>
+      <p:nvGrpSpPr>
+        <p:cNvPr id="1" name=""/>
+        <p:cNvGrpSpPr/>
+        <p:nvPr/>
+      </p:nvGrpSpPr>
+      <p:grpSpPr>
+        <a:xfrm>
+          <a:off x="0" y="0"/>
+          <a:ext cx="0" cy="0"/>
+          <a:chOff x="0" y="0"/>
+          <a:chExt cx="0" cy="0"/>
+        </a:xfrm>
+      </p:grpSpPr>
+      <p:sp>
+        <p:nvSpPr>
+          <p:cNvPr id="2" name="Title 1">
+            <a:extLst>
+              <a:ext uri="{FF2B5EF4-FFF2-40B4-BE49-F238E27FC236}">
+                <a16:creationId xmlns:a16="http://schemas.microsoft.com/office/drawing/2014/main" id="{601425CA-8701-43F1-900F-6E96EEA55FAB}"/>
+              </a:ext>
+            </a:extLst>
+          </p:cNvPr>
+          <p:cNvSpPr>
+            <a:spLocks noGrp="1"/>
+          </p:cNvSpPr>
+          <p:nvPr>
+            <p:ph type="title"/>
+          </p:nvPr>
+        </p:nvSpPr>
+        <p:spPr/>
+        <p:txBody>
+          <a:bodyPr/>
+          <a:lstStyle/>
+          <a:p>
+            <a:endParaRPr lang="en-US"/>
+          </a:p>
+        </p:txBody>
+      </p:sp>
+      <p:pic>
+        <p:nvPicPr>
+          <p:cNvPr id="5" name="Picture 4">
+            <a:extLst>
+              <a:ext uri="{FF2B5EF4-FFF2-40B4-BE49-F238E27FC236}">
+                <a16:creationId xmlns:a16="http://schemas.microsoft.com/office/drawing/2014/main" id="{9974D6C9-5A65-4907-9CA3-58A17DF74A4C}"/>
+              </a:ext>
+            </a:extLst>
+          </p:cNvPr>
+          <p:cNvPicPr>
+            <a:picLocks noChangeAspect="1"/>
+          </p:cNvPicPr>
+          <p:nvPr/>
+        </p:nvPicPr>
+        <p:blipFill>
+          <a:blip r:embed="rId2"/>
+          <a:stretch>
+            <a:fillRect/>
+          </a:stretch>
+        </p:blipFill>
+        <p:spPr>
+          <a:xfrm>
+            <a:off x="1522980" y="2015553"/>
+            <a:ext cx="3786640" cy="2107396"/>
+          </a:xfrm>
+          <a:prstGeom prst="rect">
+            <a:avLst/>
+          </a:prstGeom>
+        </p:spPr>
+      </p:pic>
+      <p:pic>
+        <p:nvPicPr>
+          <p:cNvPr id="7" name="Picture 6">
+            <a:extLst>
+              <a:ext uri="{FF2B5EF4-FFF2-40B4-BE49-F238E27FC236}">
+                <a16:creationId xmlns:a16="http://schemas.microsoft.com/office/drawing/2014/main" id="{C0EA7D6F-7D12-4331-96D0-DB900428804F}"/>
+              </a:ext>
+            </a:extLst>
+          </p:cNvPr>
+          <p:cNvPicPr>
+            <a:picLocks noChangeAspect="1"/>
+          </p:cNvPicPr>
+          <p:nvPr/>
+        </p:nvPicPr>
+        <p:blipFill>
+          <a:blip r:embed="rId3"/>
+          <a:stretch>
+            <a:fillRect/>
+          </a:stretch>
+        </p:blipFill>
+        <p:spPr>
+          <a:xfrm>
+            <a:off x="1425575" y="4447815"/>
+            <a:ext cx="9144000" cy="1221042"/>
+          </a:xfrm>
+          <a:prstGeom prst="rect">
+            <a:avLst/>
+          </a:prstGeom>
+        </p:spPr>
+      </p:pic>
+      <p:sp>
+        <p:nvSpPr>
+          <p:cNvPr id="4" name="Slide Number Placeholder 3">
+            <a:extLst>
+              <a:ext uri="{FF2B5EF4-FFF2-40B4-BE49-F238E27FC236}">
+                <a16:creationId xmlns:a16="http://schemas.microsoft.com/office/drawing/2014/main" id="{69A2A436-768F-4A4D-9E89-B9FEB9153478}"/>
+              </a:ext>
+            </a:extLst>
+          </p:cNvPr>
+          <p:cNvSpPr>
+            <a:spLocks noGrp="1"/>
+          </p:cNvSpPr>
+          <p:nvPr>
+            <p:ph type="sldNum" sz="quarter" idx="12"/>
+          </p:nvPr>
+        </p:nvSpPr>
+        <p:spPr/>
+        <p:txBody>
+          <a:bodyPr/>
+          <a:lstStyle/>
+          <a:p>
+            <a:fld id="{6CB50425-FF15-4809-B051-6F0DDC60174A}" type="slidenum">
+              <a:rPr lang="en-US" smtClean="0"/>
+              <a:t>17</a:t>
+            </a:fld>
+            <a:endParaRPr lang="en-US"/>
+          </a:p>
+        </p:txBody>
+      </p:sp>
+    </p:spTree>
+    <p:extLst>
+      <p:ext uri="{BB962C8B-B14F-4D97-AF65-F5344CB8AC3E}">
+        <p14:creationId xmlns:p14="http://schemas.microsoft.com/office/powerpoint/2010/main" val="798232893"/>
+      </p:ext>
+    </p:extLst>
+  </p:cSld>
+  <p:clrMapOvr>
+    <a:masterClrMapping/>
+  </p:clrMapOvr>
+</p:sld>
+</file>
+
+<file path=ppt/slides/slide18.xml><?xml version="1.0" encoding="utf-8"?>
 <p:sld xmlns:a="http://schemas.openxmlformats.org/drawingml/2006/main" xmlns:r="http://schemas.openxmlformats.org/officeDocument/2006/relationships" xmlns:p="http://schemas.openxmlformats.org/presentationml/2006/main" show="0">
   <p:cSld>
     <p:spTree>
@@ -13136,7 +13324,7 @@
         </p:blipFill>
         <p:spPr>
           <a:xfrm>
-            <a:off x="6516913" y="2058748"/>
+            <a:off x="6522287" y="2058748"/>
             <a:ext cx="5127172" cy="2740504"/>
           </a:xfrm>
           <a:custGeom>
@@ -13576,7 +13764,7 @@
           <a:p>
             <a:fld id="{6CB50425-FF15-4809-B051-6F0DDC60174A}" type="slidenum">
               <a:rPr lang="en-US" smtClean="0"/>
-              <a:t>17</a:t>
+              <a:t>18</a:t>
             </a:fld>
             <a:endParaRPr lang="en-US"/>
           </a:p>

</xml_diff>